<commit_message>
[2015.js] Start slides around web components
</commit_message>
<xml_diff>
--- a/2015.js/JavaScript trends 2015.pptx
+++ b/2015.js/JavaScript trends 2015.pptx
@@ -5,7 +5,7 @@
     <p:sldMasterId id="2147483648" r:id="rId1"/>
   </p:sldMasterIdLst>
   <p:notesMasterIdLst>
-    <p:notesMasterId r:id="rId25"/>
+    <p:notesMasterId r:id="rId30"/>
   </p:notesMasterIdLst>
   <p:sldIdLst>
     <p:sldId id="256" r:id="rId2"/>
@@ -31,6 +31,11 @@
     <p:sldId id="276" r:id="rId22"/>
     <p:sldId id="277" r:id="rId23"/>
     <p:sldId id="278" r:id="rId24"/>
+    <p:sldId id="279" r:id="rId25"/>
+    <p:sldId id="280" r:id="rId26"/>
+    <p:sldId id="281" r:id="rId27"/>
+    <p:sldId id="282" r:id="rId28"/>
+    <p:sldId id="283" r:id="rId29"/>
   </p:sldIdLst>
   <p:sldSz cx="12192000" cy="6858000"/>
   <p:notesSz cx="6858000" cy="9144000"/>
@@ -129,6 +134,11 @@
       </a:defRPr>
     </a:lvl9pPr>
   </p:defaultTextStyle>
+  <p:extLst>
+    <p:ext uri="{EFAFB233-063F-42B5-8137-9DF3F51BA10A}">
+      <p15:sldGuideLst xmlns:p15="http://schemas.microsoft.com/office/powerpoint/2012/main"/>
+    </p:ext>
+  </p:extLst>
 </p:presentation>
 </file>
 
@@ -214,7 +224,7 @@
           <a:p>
             <a:fld id="{A18515C8-1E5F-429F-BB56-A25142CE5CCE}" type="datetimeFigureOut">
               <a:rPr lang="en-US" smtClean="0"/>
-              <a:t>05/02/2015</a:t>
+              <a:t>06/02/2015</a:t>
             </a:fld>
             <a:endParaRPr lang="en-US"/>
           </a:p>
@@ -1395,6 +1405,128 @@
 </p:notes>
 </file>
 
+<file path=ppt/notesSlides/notesSlide19.xml><?xml version="1.0" encoding="utf-8"?>
+<p:notes xmlns:a="http://schemas.openxmlformats.org/drawingml/2006/main" xmlns:r="http://schemas.openxmlformats.org/officeDocument/2006/relationships" xmlns:p="http://schemas.openxmlformats.org/presentationml/2006/main">
+  <p:cSld>
+    <p:spTree>
+      <p:nvGrpSpPr>
+        <p:cNvPr id="1" name=""/>
+        <p:cNvGrpSpPr/>
+        <p:nvPr/>
+      </p:nvGrpSpPr>
+      <p:grpSpPr>
+        <a:xfrm>
+          <a:off x="0" y="0"/>
+          <a:ext cx="0" cy="0"/>
+          <a:chOff x="0" y="0"/>
+          <a:chExt cx="0" cy="0"/>
+        </a:xfrm>
+      </p:grpSpPr>
+      <p:sp>
+        <p:nvSpPr>
+          <p:cNvPr id="2" name="Slide Image Placeholder 1"/>
+          <p:cNvSpPr>
+            <a:spLocks noGrp="1" noRot="1" noChangeAspect="1"/>
+          </p:cNvSpPr>
+          <p:nvPr>
+            <p:ph type="sldImg"/>
+          </p:nvPr>
+        </p:nvSpPr>
+        <p:spPr/>
+      </p:sp>
+      <p:sp>
+        <p:nvSpPr>
+          <p:cNvPr id="3" name="Notes Placeholder 2"/>
+          <p:cNvSpPr>
+            <a:spLocks noGrp="1"/>
+          </p:cNvSpPr>
+          <p:nvPr>
+            <p:ph type="body" idx="1"/>
+          </p:nvPr>
+        </p:nvSpPr>
+        <p:spPr/>
+        <p:txBody>
+          <a:bodyPr/>
+          <a:lstStyle/>
+          <a:p>
+            <a:r>
+              <a:rPr lang="ru-RU" dirty="0" smtClean="0"/>
+              <a:t>Заканчивается 10-летняя эпоха JS-библиотек, упростивших на долгие годы жизнь веб-разработчиков, заполнявших пробелы между браузерами и недостаточную скорость развития веб-стандартов (кстати, в феврале 2015 будет 10 лет Prototype, если помните такой, в июне – script.aculo.us, а в сентябре — MooTools!).</a:t>
+            </a:r>
+            <a:endParaRPr lang="en-US" dirty="0" smtClean="0"/>
+          </a:p>
+          <a:p>
+            <a:endParaRPr lang="en-US" dirty="0" smtClean="0"/>
+          </a:p>
+          <a:p>
+            <a:r>
+              <a:rPr lang="ru-RU" dirty="0" smtClean="0"/>
+              <a:t>Как правило это одностраничные решения, требующие декомпозиции, шаблонизации, связывания данных, модульной структуры и т.п.</a:t>
+            </a:r>
+            <a:endParaRPr lang="en-US" dirty="0" smtClean="0"/>
+          </a:p>
+          <a:p>
+            <a:endParaRPr lang="en-US" dirty="0" smtClean="0"/>
+          </a:p>
+          <a:p>
+            <a:r>
+              <a:rPr lang="ru-RU" dirty="0" smtClean="0"/>
+              <a:t>Хотите использовать WinJS с React?</a:t>
+            </a:r>
+            <a:r>
+              <a:rPr lang="en-US" dirty="0" smtClean="0"/>
+              <a:t> </a:t>
+            </a:r>
+            <a:r>
+              <a:rPr lang="ru-RU" dirty="0" smtClean="0">
+                <a:hlinkClick r:id="rId3"/>
+              </a:rPr>
+              <a:t>Используйте</a:t>
+            </a:r>
+            <a:r>
+              <a:rPr lang="ru-RU" dirty="0" smtClean="0"/>
+              <a:t>.</a:t>
+            </a:r>
+            <a:endParaRPr lang="en-US" dirty="0"/>
+          </a:p>
+        </p:txBody>
+      </p:sp>
+      <p:sp>
+        <p:nvSpPr>
+          <p:cNvPr id="4" name="Slide Number Placeholder 3"/>
+          <p:cNvSpPr>
+            <a:spLocks noGrp="1"/>
+          </p:cNvSpPr>
+          <p:nvPr>
+            <p:ph type="sldNum" sz="quarter" idx="10"/>
+          </p:nvPr>
+        </p:nvSpPr>
+        <p:spPr/>
+        <p:txBody>
+          <a:bodyPr/>
+          <a:lstStyle/>
+          <a:p>
+            <a:fld id="{183F1048-755A-4879-91E6-1BA3456E7611}" type="slidenum">
+              <a:rPr lang="en-US" smtClean="0"/>
+              <a:t>25</a:t>
+            </a:fld>
+            <a:endParaRPr lang="en-US"/>
+          </a:p>
+        </p:txBody>
+      </p:sp>
+    </p:spTree>
+    <p:extLst>
+      <p:ext uri="{BB962C8B-B14F-4D97-AF65-F5344CB8AC3E}">
+        <p14:creationId xmlns:p14="http://schemas.microsoft.com/office/powerpoint/2010/main" val="877732534"/>
+      </p:ext>
+    </p:extLst>
+  </p:cSld>
+  <p:clrMapOvr>
+    <a:masterClrMapping/>
+  </p:clrMapOvr>
+</p:notes>
+</file>
+
 <file path=ppt/notesSlides/notesSlide2.xml><?xml version="1.0" encoding="utf-8"?>
 <p:notes xmlns:a="http://schemas.openxmlformats.org/drawingml/2006/main" xmlns:r="http://schemas.openxmlformats.org/officeDocument/2006/relationships" xmlns:p="http://schemas.openxmlformats.org/presentationml/2006/main">
   <p:cSld>
@@ -1494,6 +1626,379 @@
     <p:extLst>
       <p:ext uri="{BB962C8B-B14F-4D97-AF65-F5344CB8AC3E}">
         <p14:creationId xmlns:p14="http://schemas.microsoft.com/office/powerpoint/2010/main" val="1254137438"/>
+      </p:ext>
+    </p:extLst>
+  </p:cSld>
+  <p:clrMapOvr>
+    <a:masterClrMapping/>
+  </p:clrMapOvr>
+</p:notes>
+</file>
+
+<file path=ppt/notesSlides/notesSlide20.xml><?xml version="1.0" encoding="utf-8"?>
+<p:notes xmlns:a="http://schemas.openxmlformats.org/drawingml/2006/main" xmlns:r="http://schemas.openxmlformats.org/officeDocument/2006/relationships" xmlns:p="http://schemas.openxmlformats.org/presentationml/2006/main">
+  <p:cSld>
+    <p:spTree>
+      <p:nvGrpSpPr>
+        <p:cNvPr id="1" name=""/>
+        <p:cNvGrpSpPr/>
+        <p:nvPr/>
+      </p:nvGrpSpPr>
+      <p:grpSpPr>
+        <a:xfrm>
+          <a:off x="0" y="0"/>
+          <a:ext cx="0" cy="0"/>
+          <a:chOff x="0" y="0"/>
+          <a:chExt cx="0" cy="0"/>
+        </a:xfrm>
+      </p:grpSpPr>
+      <p:sp>
+        <p:nvSpPr>
+          <p:cNvPr id="2" name="Slide Image Placeholder 1"/>
+          <p:cNvSpPr>
+            <a:spLocks noGrp="1" noRot="1" noChangeAspect="1"/>
+          </p:cNvSpPr>
+          <p:nvPr>
+            <p:ph type="sldImg"/>
+          </p:nvPr>
+        </p:nvSpPr>
+        <p:spPr/>
+      </p:sp>
+      <p:sp>
+        <p:nvSpPr>
+          <p:cNvPr id="3" name="Notes Placeholder 2"/>
+          <p:cNvSpPr>
+            <a:spLocks noGrp="1"/>
+          </p:cNvSpPr>
+          <p:nvPr>
+            <p:ph type="body" idx="1"/>
+          </p:nvPr>
+        </p:nvSpPr>
+        <p:spPr/>
+        <p:txBody>
+          <a:bodyPr/>
+          <a:lstStyle/>
+          <a:p>
+            <a:r>
+              <a:rPr lang="ru-RU" dirty="0" smtClean="0"/>
+              <a:t>Вторая версия Angular тому хороший пример.</a:t>
+            </a:r>
+            <a:endParaRPr lang="en-US" dirty="0" smtClean="0"/>
+          </a:p>
+          <a:p>
+            <a:endParaRPr lang="en-US" dirty="0" smtClean="0"/>
+          </a:p>
+          <a:p>
+            <a:r>
+              <a:rPr lang="en-US" dirty="0" smtClean="0"/>
+              <a:t>Microsoft </a:t>
+            </a:r>
+            <a:r>
+              <a:rPr lang="ru-RU" dirty="0" smtClean="0"/>
+              <a:t>переписывает </a:t>
+            </a:r>
+            <a:r>
+              <a:rPr lang="en-US" dirty="0" err="1" smtClean="0"/>
+              <a:t>WinJS</a:t>
+            </a:r>
+            <a:r>
+              <a:rPr lang="en-US" dirty="0" smtClean="0"/>
+              <a:t> </a:t>
+            </a:r>
+            <a:r>
+              <a:rPr lang="ru-RU" dirty="0" smtClean="0"/>
+              <a:t>на </a:t>
+            </a:r>
+            <a:r>
+              <a:rPr lang="en-US" dirty="0" err="1" smtClean="0"/>
+              <a:t>TypeScript</a:t>
+            </a:r>
+            <a:r>
+              <a:rPr lang="en-US" dirty="0" smtClean="0"/>
+              <a:t>, Google </a:t>
+            </a:r>
+            <a:r>
+              <a:rPr lang="ru-RU" dirty="0" smtClean="0"/>
+              <a:t>для </a:t>
+            </a:r>
+            <a:r>
+              <a:rPr lang="en-US" dirty="0" smtClean="0"/>
+              <a:t>Angular 2.0 </a:t>
+            </a:r>
+            <a:r>
+              <a:rPr lang="ru-RU" dirty="0" smtClean="0"/>
+              <a:t>готовит </a:t>
+            </a:r>
+            <a:r>
+              <a:rPr lang="en-US" dirty="0" err="1" smtClean="0"/>
+              <a:t>AtScript</a:t>
+            </a:r>
+            <a:r>
+              <a:rPr lang="en-US" dirty="0" smtClean="0"/>
+              <a:t>, Facebook </a:t>
+            </a:r>
+            <a:r>
+              <a:rPr lang="ru-RU" dirty="0" smtClean="0"/>
+              <a:t>пишет </a:t>
+            </a:r>
+            <a:r>
+              <a:rPr lang="en-US" dirty="0" err="1" smtClean="0"/>
+              <a:t>ReactJS</a:t>
+            </a:r>
+            <a:r>
+              <a:rPr lang="en-US" dirty="0" smtClean="0"/>
+              <a:t> </a:t>
+            </a:r>
+            <a:r>
+              <a:rPr lang="ru-RU" dirty="0" smtClean="0"/>
+              <a:t>на </a:t>
+            </a:r>
+            <a:r>
+              <a:rPr lang="en-US" dirty="0" smtClean="0"/>
+              <a:t>Flow</a:t>
+            </a:r>
+          </a:p>
+          <a:p>
+            <a:endParaRPr lang="en-US" dirty="0" smtClean="0"/>
+          </a:p>
+          <a:p>
+            <a:pPr marL="0" marR="0" indent="0" algn="l" defTabSz="914400" rtl="0" eaLnBrk="1" fontAlgn="auto" latinLnBrk="0" hangingPunct="1">
+              <a:lnSpc>
+                <a:spcPct val="100000"/>
+              </a:lnSpc>
+              <a:spcBef>
+                <a:spcPts val="0"/>
+              </a:spcBef>
+              <a:spcAft>
+                <a:spcPts val="0"/>
+              </a:spcAft>
+              <a:buClrTx/>
+              <a:buSzTx/>
+              <a:buFontTx/>
+              <a:buNone/>
+              <a:tabLst/>
+              <a:defRPr/>
+            </a:pPr>
+            <a:r>
+              <a:rPr lang="ru-RU" dirty="0" smtClean="0"/>
+              <a:t>Хотите использовать WinJS с React?</a:t>
+            </a:r>
+            <a:r>
+              <a:rPr lang="en-US" dirty="0" smtClean="0"/>
+              <a:t> </a:t>
+            </a:r>
+            <a:r>
+              <a:rPr lang="ru-RU" dirty="0" smtClean="0">
+                <a:hlinkClick r:id="rId3"/>
+              </a:rPr>
+              <a:t>Используйте</a:t>
+            </a:r>
+            <a:r>
+              <a:rPr lang="ru-RU" dirty="0" smtClean="0"/>
+              <a:t>.</a:t>
+            </a:r>
+            <a:endParaRPr lang="en-US" dirty="0" smtClean="0"/>
+          </a:p>
+          <a:p>
+            <a:endParaRPr lang="en-US" dirty="0"/>
+          </a:p>
+        </p:txBody>
+      </p:sp>
+      <p:sp>
+        <p:nvSpPr>
+          <p:cNvPr id="4" name="Slide Number Placeholder 3"/>
+          <p:cNvSpPr>
+            <a:spLocks noGrp="1"/>
+          </p:cNvSpPr>
+          <p:nvPr>
+            <p:ph type="sldNum" sz="quarter" idx="10"/>
+          </p:nvPr>
+        </p:nvSpPr>
+        <p:spPr/>
+        <p:txBody>
+          <a:bodyPr/>
+          <a:lstStyle/>
+          <a:p>
+            <a:fld id="{183F1048-755A-4879-91E6-1BA3456E7611}" type="slidenum">
+              <a:rPr lang="en-US" smtClean="0"/>
+              <a:t>26</a:t>
+            </a:fld>
+            <a:endParaRPr lang="en-US"/>
+          </a:p>
+        </p:txBody>
+      </p:sp>
+    </p:spTree>
+    <p:extLst>
+      <p:ext uri="{BB962C8B-B14F-4D97-AF65-F5344CB8AC3E}">
+        <p14:creationId xmlns:p14="http://schemas.microsoft.com/office/powerpoint/2010/main" val="995166386"/>
+      </p:ext>
+    </p:extLst>
+  </p:cSld>
+  <p:clrMapOvr>
+    <a:masterClrMapping/>
+  </p:clrMapOvr>
+</p:notes>
+</file>
+
+<file path=ppt/notesSlides/notesSlide21.xml><?xml version="1.0" encoding="utf-8"?>
+<p:notes xmlns:a="http://schemas.openxmlformats.org/drawingml/2006/main" xmlns:r="http://schemas.openxmlformats.org/officeDocument/2006/relationships" xmlns:p="http://schemas.openxmlformats.org/presentationml/2006/main">
+  <p:cSld>
+    <p:spTree>
+      <p:nvGrpSpPr>
+        <p:cNvPr id="1" name=""/>
+        <p:cNvGrpSpPr/>
+        <p:nvPr/>
+      </p:nvGrpSpPr>
+      <p:grpSpPr>
+        <a:xfrm>
+          <a:off x="0" y="0"/>
+          <a:ext cx="0" cy="0"/>
+          <a:chOff x="0" y="0"/>
+          <a:chExt cx="0" cy="0"/>
+        </a:xfrm>
+      </p:grpSpPr>
+      <p:sp>
+        <p:nvSpPr>
+          <p:cNvPr id="2" name="Slide Image Placeholder 1"/>
+          <p:cNvSpPr>
+            <a:spLocks noGrp="1" noRot="1" noChangeAspect="1"/>
+          </p:cNvSpPr>
+          <p:nvPr>
+            <p:ph type="sldImg"/>
+          </p:nvPr>
+        </p:nvSpPr>
+        <p:spPr/>
+      </p:sp>
+      <p:sp>
+        <p:nvSpPr>
+          <p:cNvPr id="3" name="Notes Placeholder 2"/>
+          <p:cNvSpPr>
+            <a:spLocks noGrp="1"/>
+          </p:cNvSpPr>
+          <p:nvPr>
+            <p:ph type="body" idx="1"/>
+          </p:nvPr>
+        </p:nvSpPr>
+        <p:spPr/>
+        <p:txBody>
+          <a:bodyPr/>
+          <a:lstStyle/>
+          <a:p>
+            <a:endParaRPr lang="en-US" dirty="0"/>
+          </a:p>
+        </p:txBody>
+      </p:sp>
+      <p:sp>
+        <p:nvSpPr>
+          <p:cNvPr id="4" name="Slide Number Placeholder 3"/>
+          <p:cNvSpPr>
+            <a:spLocks noGrp="1"/>
+          </p:cNvSpPr>
+          <p:nvPr>
+            <p:ph type="sldNum" sz="quarter" idx="10"/>
+          </p:nvPr>
+        </p:nvSpPr>
+        <p:spPr/>
+        <p:txBody>
+          <a:bodyPr/>
+          <a:lstStyle/>
+          <a:p>
+            <a:fld id="{183F1048-755A-4879-91E6-1BA3456E7611}" type="slidenum">
+              <a:rPr lang="en-US" smtClean="0"/>
+              <a:t>27</a:t>
+            </a:fld>
+            <a:endParaRPr lang="en-US"/>
+          </a:p>
+        </p:txBody>
+      </p:sp>
+    </p:spTree>
+    <p:extLst>
+      <p:ext uri="{BB962C8B-B14F-4D97-AF65-F5344CB8AC3E}">
+        <p14:creationId xmlns:p14="http://schemas.microsoft.com/office/powerpoint/2010/main" val="122256347"/>
+      </p:ext>
+    </p:extLst>
+  </p:cSld>
+  <p:clrMapOvr>
+    <a:masterClrMapping/>
+  </p:clrMapOvr>
+</p:notes>
+</file>
+
+<file path=ppt/notesSlides/notesSlide22.xml><?xml version="1.0" encoding="utf-8"?>
+<p:notes xmlns:a="http://schemas.openxmlformats.org/drawingml/2006/main" xmlns:r="http://schemas.openxmlformats.org/officeDocument/2006/relationships" xmlns:p="http://schemas.openxmlformats.org/presentationml/2006/main">
+  <p:cSld>
+    <p:spTree>
+      <p:nvGrpSpPr>
+        <p:cNvPr id="1" name=""/>
+        <p:cNvGrpSpPr/>
+        <p:nvPr/>
+      </p:nvGrpSpPr>
+      <p:grpSpPr>
+        <a:xfrm>
+          <a:off x="0" y="0"/>
+          <a:ext cx="0" cy="0"/>
+          <a:chOff x="0" y="0"/>
+          <a:chExt cx="0" cy="0"/>
+        </a:xfrm>
+      </p:grpSpPr>
+      <p:sp>
+        <p:nvSpPr>
+          <p:cNvPr id="2" name="Slide Image Placeholder 1"/>
+          <p:cNvSpPr>
+            <a:spLocks noGrp="1" noRot="1" noChangeAspect="1"/>
+          </p:cNvSpPr>
+          <p:nvPr>
+            <p:ph type="sldImg"/>
+          </p:nvPr>
+        </p:nvSpPr>
+        <p:spPr/>
+      </p:sp>
+      <p:sp>
+        <p:nvSpPr>
+          <p:cNvPr id="3" name="Notes Placeholder 2"/>
+          <p:cNvSpPr>
+            <a:spLocks noGrp="1"/>
+          </p:cNvSpPr>
+          <p:nvPr>
+            <p:ph type="body" idx="1"/>
+          </p:nvPr>
+        </p:nvSpPr>
+        <p:spPr/>
+        <p:txBody>
+          <a:bodyPr/>
+          <a:lstStyle/>
+          <a:p>
+            <a:endParaRPr lang="en-US" dirty="0"/>
+          </a:p>
+        </p:txBody>
+      </p:sp>
+      <p:sp>
+        <p:nvSpPr>
+          <p:cNvPr id="4" name="Slide Number Placeholder 3"/>
+          <p:cNvSpPr>
+            <a:spLocks noGrp="1"/>
+          </p:cNvSpPr>
+          <p:nvPr>
+            <p:ph type="sldNum" sz="quarter" idx="10"/>
+          </p:nvPr>
+        </p:nvSpPr>
+        <p:spPr/>
+        <p:txBody>
+          <a:bodyPr/>
+          <a:lstStyle/>
+          <a:p>
+            <a:fld id="{183F1048-755A-4879-91E6-1BA3456E7611}" type="slidenum">
+              <a:rPr lang="en-US" smtClean="0"/>
+              <a:t>28</a:t>
+            </a:fld>
+            <a:endParaRPr lang="en-US"/>
+          </a:p>
+        </p:txBody>
+      </p:sp>
+    </p:spTree>
+    <p:extLst>
+      <p:ext uri="{BB962C8B-B14F-4D97-AF65-F5344CB8AC3E}">
+        <p14:creationId xmlns:p14="http://schemas.microsoft.com/office/powerpoint/2010/main" val="3160860008"/>
       </p:ext>
     </p:extLst>
   </p:cSld>
@@ -2222,7 +2727,7 @@
           <a:p>
             <a:fld id="{940A818D-9559-4D9A-B9E7-A489122B379C}" type="datetimeFigureOut">
               <a:rPr lang="en-US" smtClean="0"/>
-              <a:t>05/02/2015</a:t>
+              <a:t>06/02/2015</a:t>
             </a:fld>
             <a:endParaRPr lang="en-US"/>
           </a:p>
@@ -2392,7 +2897,7 @@
           <a:p>
             <a:fld id="{940A818D-9559-4D9A-B9E7-A489122B379C}" type="datetimeFigureOut">
               <a:rPr lang="en-US" smtClean="0"/>
-              <a:t>05/02/2015</a:t>
+              <a:t>06/02/2015</a:t>
             </a:fld>
             <a:endParaRPr lang="en-US"/>
           </a:p>
@@ -2572,7 +3077,7 @@
           <a:p>
             <a:fld id="{940A818D-9559-4D9A-B9E7-A489122B379C}" type="datetimeFigureOut">
               <a:rPr lang="en-US" smtClean="0"/>
-              <a:t>05/02/2015</a:t>
+              <a:t>06/02/2015</a:t>
             </a:fld>
             <a:endParaRPr lang="en-US"/>
           </a:p>
@@ -2742,7 +3247,7 @@
           <a:p>
             <a:fld id="{940A818D-9559-4D9A-B9E7-A489122B379C}" type="datetimeFigureOut">
               <a:rPr lang="en-US" smtClean="0"/>
-              <a:t>05/02/2015</a:t>
+              <a:t>06/02/2015</a:t>
             </a:fld>
             <a:endParaRPr lang="en-US"/>
           </a:p>
@@ -2988,7 +3493,7 @@
           <a:p>
             <a:fld id="{940A818D-9559-4D9A-B9E7-A489122B379C}" type="datetimeFigureOut">
               <a:rPr lang="en-US" smtClean="0"/>
-              <a:t>05/02/2015</a:t>
+              <a:t>06/02/2015</a:t>
             </a:fld>
             <a:endParaRPr lang="en-US"/>
           </a:p>
@@ -3220,7 +3725,7 @@
           <a:p>
             <a:fld id="{940A818D-9559-4D9A-B9E7-A489122B379C}" type="datetimeFigureOut">
               <a:rPr lang="en-US" smtClean="0"/>
-              <a:t>05/02/2015</a:t>
+              <a:t>06/02/2015</a:t>
             </a:fld>
             <a:endParaRPr lang="en-US"/>
           </a:p>
@@ -3587,7 +4092,7 @@
           <a:p>
             <a:fld id="{940A818D-9559-4D9A-B9E7-A489122B379C}" type="datetimeFigureOut">
               <a:rPr lang="en-US" smtClean="0"/>
-              <a:t>05/02/2015</a:t>
+              <a:t>06/02/2015</a:t>
             </a:fld>
             <a:endParaRPr lang="en-US"/>
           </a:p>
@@ -3705,7 +4210,7 @@
           <a:p>
             <a:fld id="{940A818D-9559-4D9A-B9E7-A489122B379C}" type="datetimeFigureOut">
               <a:rPr lang="en-US" smtClean="0"/>
-              <a:t>05/02/2015</a:t>
+              <a:t>06/02/2015</a:t>
             </a:fld>
             <a:endParaRPr lang="en-US"/>
           </a:p>
@@ -3800,7 +4305,7 @@
           <a:p>
             <a:fld id="{940A818D-9559-4D9A-B9E7-A489122B379C}" type="datetimeFigureOut">
               <a:rPr lang="en-US" smtClean="0"/>
-              <a:t>05/02/2015</a:t>
+              <a:t>06/02/2015</a:t>
             </a:fld>
             <a:endParaRPr lang="en-US"/>
           </a:p>
@@ -4077,7 +4582,7 @@
           <a:p>
             <a:fld id="{940A818D-9559-4D9A-B9E7-A489122B379C}" type="datetimeFigureOut">
               <a:rPr lang="en-US" smtClean="0"/>
-              <a:t>05/02/2015</a:t>
+              <a:t>06/02/2015</a:t>
             </a:fld>
             <a:endParaRPr lang="en-US"/>
           </a:p>
@@ -4330,7 +4835,7 @@
           <a:p>
             <a:fld id="{940A818D-9559-4D9A-B9E7-A489122B379C}" type="datetimeFigureOut">
               <a:rPr lang="en-US" smtClean="0"/>
-              <a:t>05/02/2015</a:t>
+              <a:t>06/02/2015</a:t>
             </a:fld>
             <a:endParaRPr lang="en-US"/>
           </a:p>
@@ -4543,7 +5048,7 @@
           <a:p>
             <a:fld id="{940A818D-9559-4D9A-B9E7-A489122B379C}" type="datetimeFigureOut">
               <a:rPr lang="en-US" smtClean="0"/>
-              <a:t>05/02/2015</a:t>
+              <a:t>06/02/2015</a:t>
             </a:fld>
             <a:endParaRPr lang="en-US"/>
           </a:p>
@@ -5521,14 +6026,16 @@
         </p:nvSpPr>
         <p:spPr/>
         <p:txBody>
-          <a:bodyPr/>
-          <a:lstStyle/>
-          <a:p>
-            <a:r>
-              <a:rPr lang="en-US" dirty="0" smtClean="0"/>
+          <a:bodyPr>
+            <a:normAutofit/>
+          </a:bodyPr>
+          <a:lstStyle/>
+          <a:p>
+            <a:r>
+              <a:rPr lang="en-US" sz="4100" dirty="0" smtClean="0"/>
               <a:t>What should we expect in future</a:t>
             </a:r>
-            <a:endParaRPr lang="en-US" dirty="0"/>
+            <a:endParaRPr lang="en-US" sz="4100" dirty="0"/>
           </a:p>
         </p:txBody>
       </p:sp>
@@ -5584,6 +6091,13 @@
   <p:clrMapOvr>
     <a:masterClrMapping/>
   </p:clrMapOvr>
+  <p:timing>
+    <p:tnLst>
+      <p:par>
+        <p:cTn id="1" dur="indefinite" restart="never" nodeType="tmRoot"/>
+      </p:par>
+    </p:tnLst>
+  </p:timing>
 </p:sld>
 </file>
 
@@ -6111,14 +6625,16 @@
         </p:nvSpPr>
         <p:spPr/>
         <p:txBody>
-          <a:bodyPr/>
-          <a:lstStyle/>
-          <a:p>
-            <a:r>
-              <a:rPr lang="en-US" dirty="0" smtClean="0"/>
+          <a:bodyPr>
+            <a:normAutofit/>
+          </a:bodyPr>
+          <a:lstStyle/>
+          <a:p>
+            <a:r>
+              <a:rPr lang="en-US" sz="4100" dirty="0" smtClean="0"/>
               <a:t>What should we expect in future</a:t>
             </a:r>
-            <a:endParaRPr lang="en-US" dirty="0"/>
+            <a:endParaRPr lang="en-US" sz="4100" dirty="0"/>
           </a:p>
         </p:txBody>
       </p:sp>
@@ -6171,6 +6687,13 @@
   <p:clrMapOvr>
     <a:masterClrMapping/>
   </p:clrMapOvr>
+  <p:timing>
+    <p:tnLst>
+      <p:par>
+        <p:cTn id="1" dur="indefinite" restart="never" nodeType="tmRoot"/>
+      </p:par>
+    </p:tnLst>
+  </p:timing>
 </p:sld>
 </file>
 
@@ -6414,6 +6937,13 @@
   <p:clrMapOvr>
     <a:masterClrMapping/>
   </p:clrMapOvr>
+  <p:timing>
+    <p:tnLst>
+      <p:par>
+        <p:cTn id="1" dur="indefinite" restart="never" nodeType="tmRoot"/>
+      </p:par>
+    </p:tnLst>
+  </p:timing>
 </p:sld>
 </file>
 
@@ -6569,14 +7099,16 @@
         </p:nvSpPr>
         <p:spPr/>
         <p:txBody>
-          <a:bodyPr/>
-          <a:lstStyle/>
-          <a:p>
-            <a:r>
-              <a:rPr lang="en-US" dirty="0" smtClean="0"/>
+          <a:bodyPr>
+            <a:normAutofit/>
+          </a:bodyPr>
+          <a:lstStyle/>
+          <a:p>
+            <a:r>
+              <a:rPr lang="en-US" sz="4100" dirty="0" smtClean="0"/>
               <a:t>What should we expect in future</a:t>
             </a:r>
-            <a:endParaRPr lang="en-US" dirty="0"/>
+            <a:endParaRPr lang="en-US" sz="4100" dirty="0"/>
           </a:p>
         </p:txBody>
       </p:sp>
@@ -6629,6 +7161,539 @@
   <p:clrMapOvr>
     <a:masterClrMapping/>
   </p:clrMapOvr>
+  <p:timing>
+    <p:tnLst>
+      <p:par>
+        <p:cTn id="1" dur="indefinite" restart="never" nodeType="tmRoot"/>
+      </p:par>
+    </p:tnLst>
+  </p:timing>
+</p:sld>
+</file>
+
+<file path=ppt/slides/slide24.xml><?xml version="1.0" encoding="utf-8"?>
+<p:sld xmlns:a="http://schemas.openxmlformats.org/drawingml/2006/main" xmlns:r="http://schemas.openxmlformats.org/officeDocument/2006/relationships" xmlns:p="http://schemas.openxmlformats.org/presentationml/2006/main">
+  <p:cSld>
+    <p:spTree>
+      <p:nvGrpSpPr>
+        <p:cNvPr id="1" name=""/>
+        <p:cNvGrpSpPr/>
+        <p:nvPr/>
+      </p:nvGrpSpPr>
+      <p:grpSpPr>
+        <a:xfrm>
+          <a:off x="0" y="0"/>
+          <a:ext cx="0" cy="0"/>
+          <a:chOff x="0" y="0"/>
+          <a:chExt cx="0" cy="0"/>
+        </a:xfrm>
+      </p:grpSpPr>
+      <p:pic>
+        <p:nvPicPr>
+          <p:cNvPr id="1026" name="Picture 2" descr="http://habrastorage.org/files/1aa/623/ab8/1aa623ab846a4bca87f8de9d750b33f1.PNG"/>
+          <p:cNvPicPr>
+            <a:picLocks noChangeAspect="1" noChangeArrowheads="1"/>
+          </p:cNvPicPr>
+          <p:nvPr/>
+        </p:nvPicPr>
+        <p:blipFill>
+          <a:blip r:embed="rId2">
+            <a:extLst>
+              <a:ext uri="{28A0092B-C50C-407E-A947-70E740481C1C}">
+                <a14:useLocalDpi xmlns:a14="http://schemas.microsoft.com/office/drawing/2010/main" val="0"/>
+              </a:ext>
+            </a:extLst>
+          </a:blip>
+          <a:srcRect/>
+          <a:stretch>
+            <a:fillRect/>
+          </a:stretch>
+        </p:blipFill>
+        <p:spPr bwMode="auto">
+          <a:xfrm>
+            <a:off x="1523999" y="769722"/>
+            <a:ext cx="9144000" cy="5143501"/>
+          </a:xfrm>
+          <a:prstGeom prst="rect">
+            <a:avLst/>
+          </a:prstGeom>
+          <a:noFill/>
+          <a:extLst>
+            <a:ext uri="{909E8E84-426E-40DD-AFC4-6F175D3DCCD1}">
+              <a14:hiddenFill xmlns:a14="http://schemas.microsoft.com/office/drawing/2010/main">
+                <a:solidFill>
+                  <a:srgbClr val="FFFFFF"/>
+                </a:solidFill>
+              </a14:hiddenFill>
+            </a:ext>
+          </a:extLst>
+        </p:spPr>
+      </p:pic>
+      <p:sp>
+        <p:nvSpPr>
+          <p:cNvPr id="2" name="Title 1"/>
+          <p:cNvSpPr>
+            <a:spLocks noGrp="1"/>
+          </p:cNvSpPr>
+          <p:nvPr>
+            <p:ph type="title"/>
+          </p:nvPr>
+        </p:nvSpPr>
+        <p:spPr>
+          <a:xfrm>
+            <a:off x="3363108" y="1085887"/>
+            <a:ext cx="5465781" cy="1325563"/>
+          </a:xfrm>
+        </p:spPr>
+        <p:txBody>
+          <a:bodyPr/>
+          <a:lstStyle/>
+          <a:p>
+            <a:r>
+              <a:rPr lang="en-US" dirty="0">
+                <a:solidFill>
+                  <a:srgbClr val="673F69"/>
+                </a:solidFill>
+              </a:rPr>
+              <a:t>Coping with complexity</a:t>
+            </a:r>
+          </a:p>
+        </p:txBody>
+      </p:sp>
+    </p:spTree>
+    <p:extLst>
+      <p:ext uri="{BB962C8B-B14F-4D97-AF65-F5344CB8AC3E}">
+        <p14:creationId xmlns:p14="http://schemas.microsoft.com/office/powerpoint/2010/main" val="597193030"/>
+      </p:ext>
+    </p:extLst>
+  </p:cSld>
+  <p:clrMapOvr>
+    <a:masterClrMapping/>
+  </p:clrMapOvr>
+  <p:timing>
+    <p:tnLst>
+      <p:par>
+        <p:cTn id="1" dur="indefinite" restart="never" nodeType="tmRoot"/>
+      </p:par>
+    </p:tnLst>
+  </p:timing>
+</p:sld>
+</file>
+
+<file path=ppt/slides/slide25.xml><?xml version="1.0" encoding="utf-8"?>
+<p:sld xmlns:a="http://schemas.openxmlformats.org/drawingml/2006/main" xmlns:r="http://schemas.openxmlformats.org/officeDocument/2006/relationships" xmlns:p="http://schemas.openxmlformats.org/presentationml/2006/main">
+  <p:cSld>
+    <p:spTree>
+      <p:nvGrpSpPr>
+        <p:cNvPr id="1" name=""/>
+        <p:cNvGrpSpPr/>
+        <p:nvPr/>
+      </p:nvGrpSpPr>
+      <p:grpSpPr>
+        <a:xfrm>
+          <a:off x="0" y="0"/>
+          <a:ext cx="0" cy="0"/>
+          <a:chOff x="0" y="0"/>
+          <a:chExt cx="0" cy="0"/>
+        </a:xfrm>
+      </p:grpSpPr>
+      <p:sp>
+        <p:nvSpPr>
+          <p:cNvPr id="3" name="Content Placeholder 2"/>
+          <p:cNvSpPr>
+            <a:spLocks noGrp="1"/>
+          </p:cNvSpPr>
+          <p:nvPr>
+            <p:ph idx="1"/>
+          </p:nvPr>
+        </p:nvSpPr>
+        <p:spPr>
+          <a:xfrm>
+            <a:off x="870472" y="1536388"/>
+            <a:ext cx="10515600" cy="3627283"/>
+          </a:xfrm>
+        </p:spPr>
+        <p:txBody>
+          <a:bodyPr/>
+          <a:lstStyle/>
+          <a:p>
+            <a:r>
+              <a:rPr lang="en-US" dirty="0" smtClean="0"/>
+              <a:t>The will </a:t>
+            </a:r>
+            <a:r>
+              <a:rPr lang="en-US" dirty="0"/>
+              <a:t>to simplify the creation of complex solutions </a:t>
+            </a:r>
+            <a:r>
+              <a:rPr lang="en-US" dirty="0" smtClean="0"/>
+              <a:t>increases</a:t>
+            </a:r>
+          </a:p>
+          <a:p>
+            <a:endParaRPr lang="en-US" dirty="0"/>
+          </a:p>
+          <a:p>
+            <a:r>
+              <a:rPr lang="en-US" dirty="0" smtClean="0"/>
+              <a:t>Appearance of new players on the scene with more ambitious goals and differen</a:t>
+            </a:r>
+            <a:r>
+              <a:rPr lang="en-US" dirty="0" smtClean="0"/>
+              <a:t>t class of tasks</a:t>
+            </a:r>
+            <a:endParaRPr lang="en-US" dirty="0" smtClean="0"/>
+          </a:p>
+          <a:p>
+            <a:endParaRPr lang="en-US" dirty="0" smtClean="0"/>
+          </a:p>
+          <a:p>
+            <a:r>
+              <a:rPr lang="en-US" dirty="0" smtClean="0"/>
+              <a:t>Openness tends to synergy that fact bring us to the new level of modular interaction.</a:t>
+            </a:r>
+            <a:endParaRPr lang="en-US" dirty="0"/>
+          </a:p>
+        </p:txBody>
+      </p:sp>
+    </p:spTree>
+    <p:extLst>
+      <p:ext uri="{BB962C8B-B14F-4D97-AF65-F5344CB8AC3E}">
+        <p14:creationId xmlns:p14="http://schemas.microsoft.com/office/powerpoint/2010/main" val="675530621"/>
+      </p:ext>
+    </p:extLst>
+  </p:cSld>
+  <p:clrMapOvr>
+    <a:masterClrMapping/>
+  </p:clrMapOvr>
+  <p:timing>
+    <p:tnLst>
+      <p:par>
+        <p:cTn id="1" dur="indefinite" restart="never" nodeType="tmRoot"/>
+      </p:par>
+    </p:tnLst>
+  </p:timing>
+</p:sld>
+</file>
+
+<file path=ppt/slides/slide26.xml><?xml version="1.0" encoding="utf-8"?>
+<p:sld xmlns:a="http://schemas.openxmlformats.org/drawingml/2006/main" xmlns:r="http://schemas.openxmlformats.org/officeDocument/2006/relationships" xmlns:p="http://schemas.openxmlformats.org/presentationml/2006/main">
+  <p:cSld>
+    <p:spTree>
+      <p:nvGrpSpPr>
+        <p:cNvPr id="1" name=""/>
+        <p:cNvGrpSpPr/>
+        <p:nvPr/>
+      </p:nvGrpSpPr>
+      <p:grpSpPr>
+        <a:xfrm>
+          <a:off x="0" y="0"/>
+          <a:ext cx="0" cy="0"/>
+          <a:chOff x="0" y="0"/>
+          <a:chExt cx="0" cy="0"/>
+        </a:xfrm>
+      </p:grpSpPr>
+      <p:sp>
+        <p:nvSpPr>
+          <p:cNvPr id="2" name="Title 1"/>
+          <p:cNvSpPr>
+            <a:spLocks noGrp="1"/>
+          </p:cNvSpPr>
+          <p:nvPr>
+            <p:ph type="title"/>
+          </p:nvPr>
+        </p:nvSpPr>
+        <p:spPr>
+          <a:xfrm>
+            <a:off x="838200" y="365125"/>
+            <a:ext cx="10515600" cy="603063"/>
+          </a:xfrm>
+        </p:spPr>
+        <p:txBody>
+          <a:bodyPr>
+            <a:normAutofit fontScale="90000"/>
+          </a:bodyPr>
+          <a:lstStyle/>
+          <a:p>
+            <a:r>
+              <a:rPr lang="en-US" sz="4100" dirty="0" smtClean="0"/>
+              <a:t>How all this stuff will evolve?</a:t>
+            </a:r>
+            <a:endParaRPr lang="en-US" sz="4100" dirty="0"/>
+          </a:p>
+        </p:txBody>
+      </p:sp>
+      <p:sp>
+        <p:nvSpPr>
+          <p:cNvPr id="3" name="Content Placeholder 2"/>
+          <p:cNvSpPr>
+            <a:spLocks noGrp="1"/>
+          </p:cNvSpPr>
+          <p:nvPr>
+            <p:ph idx="1"/>
+          </p:nvPr>
+        </p:nvSpPr>
+        <p:spPr>
+          <a:xfrm>
+            <a:off x="838200" y="1108038"/>
+            <a:ext cx="10515600" cy="5068925"/>
+          </a:xfrm>
+        </p:spPr>
+        <p:txBody>
+          <a:bodyPr/>
+          <a:lstStyle/>
+          <a:p>
+            <a:endParaRPr lang="en-US" dirty="0" smtClean="0"/>
+          </a:p>
+          <a:p>
+            <a:r>
+              <a:rPr lang="en-US" dirty="0" smtClean="0"/>
+              <a:t>The community will enter to the phase of rethinking of released products and solutions</a:t>
+            </a:r>
+          </a:p>
+          <a:p>
+            <a:endParaRPr lang="en-US" dirty="0"/>
+          </a:p>
+          <a:p>
+            <a:r>
+              <a:rPr lang="en-US" dirty="0" smtClean="0"/>
+              <a:t>Complex solutions need new approaches and when JavaScript is not enough we observe attempts to fill the gap by others means </a:t>
+            </a:r>
+          </a:p>
+          <a:p>
+            <a:endParaRPr lang="en-US" dirty="0"/>
+          </a:p>
+          <a:p>
+            <a:r>
+              <a:rPr lang="en-US" dirty="0" smtClean="0"/>
+              <a:t>The </a:t>
+            </a:r>
+            <a:r>
+              <a:rPr lang="en-US" dirty="0"/>
+              <a:t>desire for compatibility and </a:t>
+            </a:r>
+            <a:r>
+              <a:rPr lang="en-US" dirty="0" smtClean="0"/>
+              <a:t>interoperability of components will grow</a:t>
+            </a:r>
+            <a:endParaRPr lang="en-US" dirty="0"/>
+          </a:p>
+        </p:txBody>
+      </p:sp>
+    </p:spTree>
+    <p:extLst>
+      <p:ext uri="{BB962C8B-B14F-4D97-AF65-F5344CB8AC3E}">
+        <p14:creationId xmlns:p14="http://schemas.microsoft.com/office/powerpoint/2010/main" val="4255077729"/>
+      </p:ext>
+    </p:extLst>
+  </p:cSld>
+  <p:clrMapOvr>
+    <a:masterClrMapping/>
+  </p:clrMapOvr>
+  <p:timing>
+    <p:tnLst>
+      <p:par>
+        <p:cTn id="1" dur="indefinite" restart="never" nodeType="tmRoot"/>
+      </p:par>
+    </p:tnLst>
+  </p:timing>
+</p:sld>
+</file>
+
+<file path=ppt/slides/slide27.xml><?xml version="1.0" encoding="utf-8"?>
+<p:sld xmlns:a="http://schemas.openxmlformats.org/drawingml/2006/main" xmlns:r="http://schemas.openxmlformats.org/officeDocument/2006/relationships" xmlns:p="http://schemas.openxmlformats.org/presentationml/2006/main">
+  <p:cSld>
+    <p:spTree>
+      <p:nvGrpSpPr>
+        <p:cNvPr id="1" name=""/>
+        <p:cNvGrpSpPr/>
+        <p:nvPr/>
+      </p:nvGrpSpPr>
+      <p:grpSpPr>
+        <a:xfrm>
+          <a:off x="0" y="0"/>
+          <a:ext cx="0" cy="0"/>
+          <a:chOff x="0" y="0"/>
+          <a:chExt cx="0" cy="0"/>
+        </a:xfrm>
+      </p:grpSpPr>
+      <p:sp>
+        <p:nvSpPr>
+          <p:cNvPr id="2" name="Title 1"/>
+          <p:cNvSpPr>
+            <a:spLocks noGrp="1"/>
+          </p:cNvSpPr>
+          <p:nvPr>
+            <p:ph type="title"/>
+          </p:nvPr>
+        </p:nvSpPr>
+        <p:spPr/>
+        <p:txBody>
+          <a:bodyPr>
+            <a:normAutofit/>
+          </a:bodyPr>
+          <a:lstStyle/>
+          <a:p>
+            <a:r>
+              <a:rPr lang="en-US" sz="4100" dirty="0" smtClean="0"/>
+              <a:t>What should we expect in future</a:t>
+            </a:r>
+            <a:endParaRPr lang="en-US" sz="4100" dirty="0"/>
+          </a:p>
+        </p:txBody>
+      </p:sp>
+      <p:sp>
+        <p:nvSpPr>
+          <p:cNvPr id="3" name="Content Placeholder 2"/>
+          <p:cNvSpPr>
+            <a:spLocks noGrp="1"/>
+          </p:cNvSpPr>
+          <p:nvPr>
+            <p:ph idx="1"/>
+          </p:nvPr>
+        </p:nvSpPr>
+        <p:spPr>
+          <a:xfrm>
+            <a:off x="838200" y="1690688"/>
+            <a:ext cx="10515600" cy="4192060"/>
+          </a:xfrm>
+        </p:spPr>
+        <p:txBody>
+          <a:bodyPr/>
+          <a:lstStyle/>
+          <a:p>
+            <a:r>
+              <a:rPr lang="en-US" dirty="0" smtClean="0"/>
+              <a:t>Releases of conceptually new versions of popular frameworks/libraries</a:t>
+            </a:r>
+            <a:endParaRPr lang="en-US" dirty="0" smtClean="0"/>
+          </a:p>
+          <a:p>
+            <a:endParaRPr lang="en-US" dirty="0" smtClean="0"/>
+          </a:p>
+          <a:p>
+            <a:r>
+              <a:rPr lang="en-US" dirty="0" smtClean="0"/>
+              <a:t>More concurrence between new players</a:t>
+            </a:r>
+          </a:p>
+          <a:p>
+            <a:endParaRPr lang="en-US" dirty="0"/>
+          </a:p>
+          <a:p>
+            <a:r>
+              <a:rPr lang="en-US" dirty="0" smtClean="0"/>
+              <a:t>Increasing of the input threshold to create complex frameworks</a:t>
+            </a:r>
+            <a:endParaRPr lang="en-US" dirty="0" smtClean="0"/>
+          </a:p>
+          <a:p>
+            <a:endParaRPr lang="en-US" dirty="0" smtClean="0"/>
+          </a:p>
+          <a:p>
+            <a:r>
+              <a:rPr lang="en-US" dirty="0" smtClean="0"/>
+              <a:t>New opportunities for solutions based on ES6</a:t>
+            </a:r>
+            <a:endParaRPr lang="en-US" dirty="0" smtClean="0"/>
+          </a:p>
+        </p:txBody>
+      </p:sp>
+    </p:spTree>
+    <p:extLst>
+      <p:ext uri="{BB962C8B-B14F-4D97-AF65-F5344CB8AC3E}">
+        <p14:creationId xmlns:p14="http://schemas.microsoft.com/office/powerpoint/2010/main" val="2303949389"/>
+      </p:ext>
+    </p:extLst>
+  </p:cSld>
+  <p:clrMapOvr>
+    <a:masterClrMapping/>
+  </p:clrMapOvr>
+  <p:timing>
+    <p:tnLst>
+      <p:par>
+        <p:cTn id="1" dur="indefinite" restart="never" nodeType="tmRoot"/>
+      </p:par>
+    </p:tnLst>
+  </p:timing>
+</p:sld>
+</file>
+
+<file path=ppt/slides/slide28.xml><?xml version="1.0" encoding="utf-8"?>
+<p:sld xmlns:a="http://schemas.openxmlformats.org/drawingml/2006/main" xmlns:r="http://schemas.openxmlformats.org/officeDocument/2006/relationships" xmlns:p="http://schemas.openxmlformats.org/presentationml/2006/main">
+  <p:cSld>
+    <p:spTree>
+      <p:nvGrpSpPr>
+        <p:cNvPr id="1" name=""/>
+        <p:cNvGrpSpPr/>
+        <p:nvPr/>
+      </p:nvGrpSpPr>
+      <p:grpSpPr>
+        <a:xfrm>
+          <a:off x="0" y="0"/>
+          <a:ext cx="0" cy="0"/>
+          <a:chOff x="0" y="0"/>
+          <a:chExt cx="0" cy="0"/>
+        </a:xfrm>
+      </p:grpSpPr>
+      <p:pic>
+        <p:nvPicPr>
+          <p:cNvPr id="2050" name="Picture 2" descr="http://habrastorage.org/files/00e/d4e/cc2/00ed4ecc239c4d7dafa74cdb2c25cc48.PNG"/>
+          <p:cNvPicPr>
+            <a:picLocks noChangeAspect="1" noChangeArrowheads="1"/>
+          </p:cNvPicPr>
+          <p:nvPr/>
+        </p:nvPicPr>
+        <p:blipFill>
+          <a:blip r:embed="rId3">
+            <a:extLst>
+              <a:ext uri="{28A0092B-C50C-407E-A947-70E740481C1C}">
+                <a14:useLocalDpi xmlns:a14="http://schemas.microsoft.com/office/drawing/2010/main" val="0"/>
+              </a:ext>
+            </a:extLst>
+          </a:blip>
+          <a:srcRect/>
+          <a:stretch>
+            <a:fillRect/>
+          </a:stretch>
+        </p:blipFill>
+        <p:spPr bwMode="auto">
+          <a:xfrm>
+            <a:off x="1554069" y="737216"/>
+            <a:ext cx="9144000" cy="5143501"/>
+          </a:xfrm>
+          <a:prstGeom prst="rect">
+            <a:avLst/>
+          </a:prstGeom>
+          <a:noFill/>
+          <a:extLst>
+            <a:ext uri="{909E8E84-426E-40DD-AFC4-6F175D3DCCD1}">
+              <a14:hiddenFill xmlns:a14="http://schemas.microsoft.com/office/drawing/2010/main">
+                <a:solidFill>
+                  <a:srgbClr val="FFFFFF"/>
+                </a:solidFill>
+              </a14:hiddenFill>
+            </a:ext>
+          </a:extLst>
+        </p:spPr>
+      </p:pic>
+    </p:spTree>
+    <p:extLst>
+      <p:ext uri="{BB962C8B-B14F-4D97-AF65-F5344CB8AC3E}">
+        <p14:creationId xmlns:p14="http://schemas.microsoft.com/office/powerpoint/2010/main" val="1427649030"/>
+      </p:ext>
+    </p:extLst>
+  </p:cSld>
+  <p:clrMapOvr>
+    <a:masterClrMapping/>
+  </p:clrMapOvr>
+  <p:timing>
+    <p:tnLst>
+      <p:par>
+        <p:cTn id="1" dur="indefinite" restart="never" nodeType="tmRoot"/>
+      </p:par>
+    </p:tnLst>
+  </p:timing>
 </p:sld>
 </file>
 
@@ -7480,14 +8545,16 @@
         </p:nvSpPr>
         <p:spPr/>
         <p:txBody>
-          <a:bodyPr/>
-          <a:lstStyle/>
-          <a:p>
-            <a:r>
-              <a:rPr lang="en-US" dirty="0" smtClean="0"/>
+          <a:bodyPr>
+            <a:normAutofit/>
+          </a:bodyPr>
+          <a:lstStyle/>
+          <a:p>
+            <a:r>
+              <a:rPr lang="en-US" sz="4100" dirty="0" smtClean="0"/>
               <a:t>What should we expect in future</a:t>
             </a:r>
-            <a:endParaRPr lang="en-US" dirty="0"/>
+            <a:endParaRPr lang="en-US" sz="4100" dirty="0"/>
           </a:p>
         </p:txBody>
       </p:sp>
@@ -7544,6 +8611,13 @@
   <p:clrMapOvr>
     <a:masterClrMapping/>
   </p:clrMapOvr>
+  <p:timing>
+    <p:tnLst>
+      <p:par>
+        <p:cTn id="1" dur="indefinite" restart="never" nodeType="tmRoot"/>
+      </p:par>
+    </p:tnLst>
+  </p:timing>
 </p:sld>
 </file>
 

</xml_diff>

<commit_message>
[2015.js] Add few cosmetic modifications
</commit_message>
<xml_diff>
--- a/2015.js/JavaScript trends 2015.pptx
+++ b/2015.js/JavaScript trends 2015.pptx
@@ -8092,8 +8092,16 @@
               <a:buChar char="-"/>
             </a:pPr>
             <a:r>
-              <a:rPr lang="fr-FR" smtClean="0"/>
-              <a:t>Personne ne sait où va nous amener cette fourchette(fork)-déviation, malgré tout cette aventure risque d'être intéressante </a:t>
+              <a:rPr lang="fr-FR" dirty="0" smtClean="0"/>
+              <a:t>Personne ne sait où va nous amener cette fourchette(</a:t>
+            </a:r>
+            <a:r>
+              <a:rPr lang="fr-FR" dirty="0" err="1" smtClean="0"/>
+              <a:t>fork</a:t>
+            </a:r>
+            <a:r>
+              <a:rPr lang="fr-FR" dirty="0" smtClean="0"/>
+              <a:t>)-déviation, malgré tout cette aventure risque d'être intéressante </a:t>
             </a:r>
           </a:p>
           <a:p>
@@ -8102,7 +8110,7 @@
               <a:buChar char="-"/>
             </a:pPr>
             <a:r>
-              <a:rPr lang="en-US" sz="1200" kern="1200" smtClean="0">
+              <a:rPr lang="en-US" sz="1200" kern="1200" dirty="0" smtClean="0">
                 <a:solidFill>
                   <a:schemeClr val="tx1"/>
                 </a:solidFill>
@@ -13972,7 +13980,12 @@
             <p:ph idx="1"/>
           </p:nvPr>
         </p:nvSpPr>
-        <p:spPr/>
+        <p:spPr>
+          <a:xfrm>
+            <a:off x="838200" y="2459747"/>
+            <a:ext cx="10515600" cy="1938507"/>
+          </a:xfrm>
+        </p:spPr>
         <p:txBody>
           <a:bodyPr/>
           <a:lstStyle/>
@@ -18071,7 +18084,7 @@
             </a:r>
             <a:r>
               <a:rPr lang="en-US" dirty="0" smtClean="0"/>
-              <a:t>based on Node.js, new experimental projects for the client side.</a:t>
+              <a:t>based on Node.js, new experimental projects for the client side</a:t>
             </a:r>
             <a:endParaRPr lang="en-US" dirty="0"/>
           </a:p>
@@ -18668,7 +18681,12 @@
             <p:ph idx="1"/>
           </p:nvPr>
         </p:nvSpPr>
-        <p:spPr/>
+        <p:spPr>
+          <a:xfrm>
+            <a:off x="838200" y="2002547"/>
+            <a:ext cx="10515600" cy="2852907"/>
+          </a:xfrm>
+        </p:spPr>
         <p:txBody>
           <a:bodyPr/>
           <a:lstStyle/>
@@ -18684,7 +18702,15 @@
           <a:p>
             <a:r>
               <a:rPr lang="en-US" dirty="0" smtClean="0"/>
-              <a:t>Assimilation by the community</a:t>
+              <a:t>Assimilation </a:t>
+            </a:r>
+            <a:r>
+              <a:rPr lang="en-US" dirty="0" smtClean="0"/>
+              <a:t>by </a:t>
+            </a:r>
+            <a:r>
+              <a:rPr lang="en-US" dirty="0" smtClean="0"/>
+              <a:t>community</a:t>
             </a:r>
           </a:p>
           <a:p>
@@ -18693,8 +18719,13 @@
           <a:p>
             <a:r>
               <a:rPr lang="en-US" dirty="0" smtClean="0"/>
-              <a:t>Adaptation by the frameworks</a:t>
-            </a:r>
+              <a:t>Adaptation by </a:t>
+            </a:r>
+            <a:r>
+              <a:rPr lang="en-US" dirty="0" smtClean="0"/>
+              <a:t>frameworks</a:t>
+            </a:r>
+            <a:endParaRPr lang="en-US" dirty="0" smtClean="0"/>
           </a:p>
           <a:p>
             <a:endParaRPr lang="en-US" dirty="0"/>

</xml_diff>